<commit_message>
clean build and gitignore
</commit_message>
<xml_diff>
--- a/Presentation1.pptx
+++ b/Presentation1.pptx
@@ -609,7 +609,28 @@
           <a:bodyPr/>
           <a:lstStyle/>
           <a:p>
-            <a:endParaRPr lang="en-US" dirty="0"/>
+            <a:r>
+              <a:rPr lang="en-US" dirty="0"/>
+              <a:t>3 tier architecture</a:t>
+            </a:r>
+          </a:p>
+          <a:p>
+            <a:r>
+              <a:rPr lang="en-US" dirty="0"/>
+              <a:t>Mobile app for both platforms mainly just for presentation </a:t>
+            </a:r>
+          </a:p>
+          <a:p>
+            <a:r>
+              <a:rPr lang="en-US" dirty="0"/>
+              <a:t>Our App server for main logic </a:t>
+            </a:r>
+          </a:p>
+          <a:p>
+            <a:r>
+              <a:rPr lang="en-US" dirty="0"/>
+              <a:t>External database to increase and scalability</a:t>
+            </a:r>
           </a:p>
         </p:txBody>
       </p:sp>
@@ -640,6 +661,93 @@
     <p:extLst>
       <p:ext uri="{BB962C8B-B14F-4D97-AF65-F5344CB8AC3E}">
         <p14:creationId xmlns:p14="http://schemas.microsoft.com/office/powerpoint/2010/main" val="3141071023"/>
+      </p:ext>
+    </p:extLst>
+  </p:cSld>
+  <p:clrMapOvr>
+    <a:masterClrMapping/>
+  </p:clrMapOvr>
+</p:notes>
+</file>
+
+<file path=ppt/notesSlides/notesSlide3.xml><?xml version="1.0" encoding="utf-8"?>
+<p:notes xmlns:a="http://schemas.openxmlformats.org/drawingml/2006/main" xmlns:r="http://schemas.openxmlformats.org/officeDocument/2006/relationships" xmlns:p="http://schemas.openxmlformats.org/presentationml/2006/main">
+  <p:cSld>
+    <p:spTree>
+      <p:nvGrpSpPr>
+        <p:cNvPr id="1" name=""/>
+        <p:cNvGrpSpPr/>
+        <p:nvPr/>
+      </p:nvGrpSpPr>
+      <p:grpSpPr>
+        <a:xfrm>
+          <a:off x="0" y="0"/>
+          <a:ext cx="0" cy="0"/>
+          <a:chOff x="0" y="0"/>
+          <a:chExt cx="0" cy="0"/>
+        </a:xfrm>
+      </p:grpSpPr>
+      <p:sp>
+        <p:nvSpPr>
+          <p:cNvPr id="2" name="Slide Image Placeholder 1"/>
+          <p:cNvSpPr>
+            <a:spLocks noGrp="1" noRot="1" noChangeAspect="1"/>
+          </p:cNvSpPr>
+          <p:nvPr>
+            <p:ph type="sldImg"/>
+          </p:nvPr>
+        </p:nvSpPr>
+        <p:spPr/>
+      </p:sp>
+      <p:sp>
+        <p:nvSpPr>
+          <p:cNvPr id="3" name="Notes Placeholder 2"/>
+          <p:cNvSpPr>
+            <a:spLocks noGrp="1"/>
+          </p:cNvSpPr>
+          <p:nvPr>
+            <p:ph type="body" idx="1"/>
+          </p:nvPr>
+        </p:nvSpPr>
+        <p:spPr/>
+        <p:txBody>
+          <a:bodyPr/>
+          <a:lstStyle/>
+          <a:p>
+            <a:r>
+              <a:rPr lang="en-US" dirty="0"/>
+              <a:t>The core are use cases: clean architecture means having one component for each use case. Two interfaces . In and out </a:t>
+            </a:r>
+          </a:p>
+        </p:txBody>
+      </p:sp>
+      <p:sp>
+        <p:nvSpPr>
+          <p:cNvPr id="4" name="Slide Number Placeholder 3"/>
+          <p:cNvSpPr>
+            <a:spLocks noGrp="1"/>
+          </p:cNvSpPr>
+          <p:nvPr>
+            <p:ph type="sldNum" sz="quarter" idx="5"/>
+          </p:nvPr>
+        </p:nvSpPr>
+        <p:spPr/>
+        <p:txBody>
+          <a:bodyPr/>
+          <a:lstStyle/>
+          <a:p>
+            <a:fld id="{65B24ED1-CF1D-8B45-A933-F8F043BDFA80}" type="slidenum">
+              <a:rPr lang="en-US" smtClean="0"/>
+              <a:t>12</a:t>
+            </a:fld>
+            <a:endParaRPr lang="en-US"/>
+          </a:p>
+        </p:txBody>
+      </p:sp>
+    </p:spTree>
+    <p:extLst>
+      <p:ext uri="{BB962C8B-B14F-4D97-AF65-F5344CB8AC3E}">
+        <p14:creationId xmlns:p14="http://schemas.microsoft.com/office/powerpoint/2010/main" val="638791856"/>
       </p:ext>
     </p:extLst>
   </p:cSld>
@@ -5052,7 +5160,7 @@
           <p:nvPr/>
         </p:nvPicPr>
         <p:blipFill>
-          <a:blip r:embed="rId2"/>
+          <a:blip r:embed="rId3"/>
           <a:stretch>
             <a:fillRect/>
           </a:stretch>
@@ -5144,7 +5252,7 @@
         </p:spPr>
         <p:txBody>
           <a:bodyPr vert="horz" lIns="91440" tIns="45720" rIns="91440" bIns="45720" rtlCol="0" anchor="ctr">
-            <a:normAutofit/>
+            <a:normAutofit fontScale="92500"/>
           </a:bodyPr>
           <a:lstStyle>
             <a:lvl1pPr algn="l" defTabSz="914400" rtl="0" eaLnBrk="1" latinLnBrk="0" hangingPunct="1">
@@ -5172,7 +5280,7 @@
                   <a:schemeClr val="bg1"/>
                 </a:solidFill>
               </a:rPr>
-              <a:t>Mobile App components</a:t>
+              <a:t>Mobile App components architecture</a:t>
             </a:r>
           </a:p>
         </p:txBody>
@@ -5370,7 +5478,7 @@
                   <a:schemeClr val="bg1"/>
                 </a:solidFill>
               </a:rPr>
-              <a:t>Server Components</a:t>
+              <a:t>Server Components architecture</a:t>
             </a:r>
             <a:endParaRPr lang="en-US" sz="5400" b="1" dirty="0">
               <a:solidFill>
@@ -8224,11 +8332,7 @@
                                           </p:stCondLst>
                                         </p:cTn>
                                         <p:tgtEl>
-                                          <p:spTgt spid="9">
-                                            <p:txEl>
-                                              <p:pRg st="0" end="0"/>
-                                            </p:txEl>
-                                          </p:spTgt>
+                                          <p:spTgt spid="9"/>
                                         </p:tgtEl>
                                         <p:attrNameLst>
                                           <p:attrName>style.visibility</p:attrName>
@@ -8273,11 +8377,7 @@
                                           </p:stCondLst>
                                         </p:cTn>
                                         <p:tgtEl>
-                                          <p:spTgt spid="9">
-                                            <p:txEl>
-                                              <p:pRg st="2" end="2"/>
-                                            </p:txEl>
-                                          </p:spTgt>
+                                          <p:spTgt spid="16"/>
                                         </p:tgtEl>
                                         <p:attrNameLst>
                                           <p:attrName>style.visibility</p:attrName>
@@ -8317,100 +8417,6 @@
                                     <p:set>
                                       <p:cBhvr>
                                         <p:cTn id="14" dur="1" fill="hold">
-                                          <p:stCondLst>
-                                            <p:cond delay="0"/>
-                                          </p:stCondLst>
-                                        </p:cTn>
-                                        <p:tgtEl>
-                                          <p:spTgt spid="9">
-                                            <p:txEl>
-                                              <p:pRg st="3" end="3"/>
-                                            </p:txEl>
-                                          </p:spTgt>
-                                        </p:tgtEl>
-                                        <p:attrNameLst>
-                                          <p:attrName>style.visibility</p:attrName>
-                                        </p:attrNameLst>
-                                      </p:cBhvr>
-                                      <p:to>
-                                        <p:strVal val="visible"/>
-                                      </p:to>
-                                    </p:set>
-                                  </p:childTnLst>
-                                </p:cTn>
-                              </p:par>
-                            </p:childTnLst>
-                          </p:cTn>
-                        </p:par>
-                      </p:childTnLst>
-                    </p:cTn>
-                  </p:par>
-                  <p:par>
-                    <p:cTn id="15" fill="hold">
-                      <p:stCondLst>
-                        <p:cond delay="indefinite"/>
-                      </p:stCondLst>
-                      <p:childTnLst>
-                        <p:par>
-                          <p:cTn id="16" fill="hold">
-                            <p:stCondLst>
-                              <p:cond delay="0"/>
-                            </p:stCondLst>
-                            <p:childTnLst>
-                              <p:par>
-                                <p:cTn id="17" presetID="1" presetClass="entr" presetSubtype="0" fill="hold" grpId="0" nodeType="clickEffect">
-                                  <p:stCondLst>
-                                    <p:cond delay="0"/>
-                                  </p:stCondLst>
-                                  <p:childTnLst>
-                                    <p:set>
-                                      <p:cBhvr>
-                                        <p:cTn id="18" dur="1" fill="hold">
-                                          <p:stCondLst>
-                                            <p:cond delay="0"/>
-                                          </p:stCondLst>
-                                        </p:cTn>
-                                        <p:tgtEl>
-                                          <p:spTgt spid="16"/>
-                                        </p:tgtEl>
-                                        <p:attrNameLst>
-                                          <p:attrName>style.visibility</p:attrName>
-                                        </p:attrNameLst>
-                                      </p:cBhvr>
-                                      <p:to>
-                                        <p:strVal val="visible"/>
-                                      </p:to>
-                                    </p:set>
-                                  </p:childTnLst>
-                                </p:cTn>
-                              </p:par>
-                            </p:childTnLst>
-                          </p:cTn>
-                        </p:par>
-                      </p:childTnLst>
-                    </p:cTn>
-                  </p:par>
-                  <p:par>
-                    <p:cTn id="19" fill="hold">
-                      <p:stCondLst>
-                        <p:cond delay="indefinite"/>
-                      </p:stCondLst>
-                      <p:childTnLst>
-                        <p:par>
-                          <p:cTn id="20" fill="hold">
-                            <p:stCondLst>
-                              <p:cond delay="0"/>
-                            </p:stCondLst>
-                            <p:childTnLst>
-                              <p:par>
-                                <p:cTn id="21" presetID="1" presetClass="entr" presetSubtype="0" fill="hold" grpId="0" nodeType="clickEffect">
-                                  <p:stCondLst>
-                                    <p:cond delay="0"/>
-                                  </p:stCondLst>
-                                  <p:childTnLst>
-                                    <p:set>
-                                      <p:cBhvr>
-                                        <p:cTn id="22" dur="1" fill="hold">
                                           <p:stCondLst>
                                             <p:cond delay="0"/>
                                           </p:stCondLst>
@@ -8457,7 +8463,7 @@
       </p:par>
     </p:tnLst>
     <p:bldLst>
-      <p:bldP spid="9" grpId="0" build="p"/>
+      <p:bldP spid="9" grpId="0"/>
       <p:bldP spid="16" grpId="0"/>
       <p:bldP spid="17" grpId="0"/>
     </p:bldLst>
@@ -8641,7 +8647,7 @@
         </p:nvSpPr>
         <p:spPr>
           <a:xfrm>
-            <a:off x="3369662" y="1817591"/>
+            <a:off x="1714598" y="1817591"/>
             <a:ext cx="3756102" cy="1815882"/>
           </a:xfrm>
           <a:prstGeom prst="rect">
@@ -8843,8 +8849,8 @@
         </p:nvSpPr>
         <p:spPr>
           <a:xfrm>
-            <a:off x="3369662" y="3895934"/>
-            <a:ext cx="2919389" cy="1169551"/>
+            <a:off x="1714598" y="3898229"/>
+            <a:ext cx="2770310" cy="1169551"/>
           </a:xfrm>
           <a:prstGeom prst="rect">
             <a:avLst/>
@@ -8872,7 +8878,7 @@
                 <a:latin typeface="Futura Light"/>
                 <a:cs typeface="Arial" panose="020B0604020202020204" pitchFamily="34" charset="0"/>
               </a:rPr>
-              <a:t>Costumer</a:t>
+              <a:t>Customer</a:t>
             </a:r>
             <a:r>
               <a:rPr lang="en-US" sz="1400" dirty="0">
@@ -8971,7 +8977,7 @@
         </p:nvSpPr>
         <p:spPr>
           <a:xfrm>
-            <a:off x="3369661" y="5065485"/>
+            <a:off x="1714598" y="5129335"/>
             <a:ext cx="2919389" cy="1169551"/>
           </a:xfrm>
           <a:prstGeom prst="rect">
@@ -9643,8 +9649,8 @@
         </p:nvSpPr>
         <p:spPr>
           <a:xfrm>
-            <a:off x="473741" y="2347217"/>
-            <a:ext cx="3096344" cy="1815882"/>
+            <a:off x="505969" y="2715057"/>
+            <a:ext cx="3495637" cy="3139321"/>
           </a:xfrm>
           <a:prstGeom prst="rect">
             <a:avLst/>
@@ -9657,94 +9663,100 @@
           <a:lstStyle/>
           <a:p>
             <a:r>
-              <a:rPr lang="en-US" sz="1400" dirty="0">
+              <a:rPr lang="en-US" dirty="0">
                 <a:latin typeface="Futura Light"/>
                 <a:cs typeface="Arial" panose="020B0604020202020204" pitchFamily="34" charset="0"/>
               </a:rPr>
               <a:t>// Each violation has only one corresponding ticket</a:t>
             </a:r>
-            <a:endParaRPr lang="fa-IR" sz="1400" dirty="0">
+            <a:endParaRPr lang="fa-IR" dirty="0">
               <a:latin typeface="Futura Light"/>
               <a:cs typeface="Arial" panose="020B0604020202020204" pitchFamily="34" charset="0"/>
             </a:endParaRPr>
           </a:p>
           <a:p>
-            <a:endParaRPr lang="en-US" sz="1400" dirty="0">
+            <a:endParaRPr lang="en-US" dirty="0">
               <a:latin typeface="Futura Light"/>
               <a:cs typeface="Arial" panose="020B0604020202020204" pitchFamily="34" charset="0"/>
             </a:endParaRPr>
           </a:p>
           <a:p>
-            <a:r>
-              <a:rPr lang="en-US" sz="1400" dirty="0">
-                <a:latin typeface="Futura Light"/>
-                <a:cs typeface="Arial" panose="020B0604020202020204" pitchFamily="34" charset="0"/>
-              </a:rPr>
-              <a:t>fact </a:t>
-            </a:r>
-            <a:r>
-              <a:rPr lang="en-US" sz="1400" dirty="0" err="1">
-                <a:latin typeface="Futura Light"/>
-                <a:cs typeface="Arial" panose="020B0604020202020204" pitchFamily="34" charset="0"/>
-              </a:rPr>
-              <a:t>EachViolatioContainsOneTicket</a:t>
-            </a:r>
-            <a:r>
-              <a:rPr lang="en-US" sz="1400" dirty="0">
-                <a:latin typeface="Futura Light"/>
-                <a:cs typeface="Arial" panose="020B0604020202020204" pitchFamily="34" charset="0"/>
-              </a:rPr>
-              <a:t> {</a:t>
-            </a:r>
-          </a:p>
-          <a:p>
-            <a:r>
-              <a:rPr lang="en-US" sz="1400" dirty="0">
-                <a:latin typeface="Futura Light"/>
-                <a:cs typeface="Arial" panose="020B0604020202020204" pitchFamily="34" charset="0"/>
-              </a:rPr>
-              <a:t>one t : Ticket , v : Violation |</a:t>
-            </a:r>
-          </a:p>
-          <a:p>
-            <a:r>
-              <a:rPr lang="en-US" sz="1400" dirty="0" err="1">
-                <a:latin typeface="Futura Light"/>
-                <a:cs typeface="Arial" panose="020B0604020202020204" pitchFamily="34" charset="0"/>
-              </a:rPr>
-              <a:t>t.violations</a:t>
-            </a:r>
-            <a:r>
-              <a:rPr lang="en-US" sz="1400" dirty="0">
-                <a:latin typeface="Futura Light"/>
-                <a:cs typeface="Arial" panose="020B0604020202020204" pitchFamily="34" charset="0"/>
-              </a:rPr>
-              <a:t> = v</a:t>
-            </a:r>
-            <a:endParaRPr lang="fa-IR" sz="1400" dirty="0">
+            <a:endParaRPr lang="en-US" dirty="0">
               <a:latin typeface="Futura Light"/>
               <a:cs typeface="Arial" panose="020B0604020202020204" pitchFamily="34" charset="0"/>
             </a:endParaRPr>
           </a:p>
           <a:p>
             <a:r>
-              <a:rPr lang="fa-IR" sz="1400" dirty="0">
-                <a:latin typeface="Futura Light"/>
-                <a:cs typeface="Arial" panose="020B0604020202020204" pitchFamily="34" charset="0"/>
-              </a:rPr>
-              <a:t>{</a:t>
-            </a:r>
-            <a:endParaRPr lang="en-US" sz="1400" dirty="0">
+              <a:rPr lang="en-US" dirty="0">
+                <a:latin typeface="Futura Light"/>
+                <a:cs typeface="Arial" panose="020B0604020202020204" pitchFamily="34" charset="0"/>
+              </a:rPr>
+              <a:t>fact </a:t>
+            </a:r>
+            <a:r>
+              <a:rPr lang="en-US" b="1" dirty="0" err="1">
+                <a:latin typeface="Futura Light"/>
+                <a:cs typeface="Arial" panose="020B0604020202020204" pitchFamily="34" charset="0"/>
+              </a:rPr>
+              <a:t>EachViolatioContainsOneTicket</a:t>
+            </a:r>
+            <a:r>
+              <a:rPr lang="en-US" dirty="0">
+                <a:latin typeface="Futura Light"/>
+                <a:cs typeface="Arial" panose="020B0604020202020204" pitchFamily="34" charset="0"/>
+              </a:rPr>
+              <a:t> {</a:t>
+            </a:r>
+          </a:p>
+          <a:p>
+            <a:r>
+              <a:rPr lang="en-US" dirty="0">
+                <a:latin typeface="Futura Light"/>
+                <a:cs typeface="Arial" panose="020B0604020202020204" pitchFamily="34" charset="0"/>
+              </a:rPr>
+              <a:t>one t : Ticket , v : Violation |</a:t>
+            </a:r>
+          </a:p>
+          <a:p>
+            <a:r>
+              <a:rPr lang="en-US" dirty="0" err="1">
+                <a:latin typeface="Futura Light"/>
+                <a:cs typeface="Arial" panose="020B0604020202020204" pitchFamily="34" charset="0"/>
+              </a:rPr>
+              <a:t>t.violations</a:t>
+            </a:r>
+            <a:r>
+              <a:rPr lang="en-US" dirty="0">
+                <a:latin typeface="Futura Light"/>
+                <a:cs typeface="Arial" panose="020B0604020202020204" pitchFamily="34" charset="0"/>
+              </a:rPr>
+              <a:t> = v</a:t>
+            </a:r>
+            <a:endParaRPr lang="fa-IR" dirty="0">
               <a:latin typeface="Futura Light"/>
               <a:cs typeface="Arial" panose="020B0604020202020204" pitchFamily="34" charset="0"/>
             </a:endParaRPr>
           </a:p>
           <a:p>
-            <a:endParaRPr lang="en-US" sz="1400" dirty="0">
+            <a:r>
+              <a:rPr lang="fa-IR" dirty="0">
+                <a:latin typeface="Futura Light"/>
+                <a:cs typeface="Arial" panose="020B0604020202020204" pitchFamily="34" charset="0"/>
+              </a:rPr>
+              <a:t>{</a:t>
+            </a:r>
+            <a:endParaRPr lang="en-US" dirty="0">
               <a:latin typeface="Futura Light"/>
               <a:cs typeface="Arial" panose="020B0604020202020204" pitchFamily="34" charset="0"/>
             </a:endParaRPr>
           </a:p>
+          <a:p>
+            <a:endParaRPr lang="en-US" dirty="0">
+              <a:latin typeface="Futura Light"/>
+              <a:cs typeface="Arial" panose="020B0604020202020204" pitchFamily="34" charset="0"/>
+            </a:endParaRPr>
+          </a:p>
         </p:txBody>
       </p:sp>
       <p:sp>
@@ -9761,8 +9773,8 @@
         </p:nvSpPr>
         <p:spPr>
           <a:xfrm>
-            <a:off x="7417163" y="2119358"/>
-            <a:ext cx="3384376" cy="2246769"/>
+            <a:off x="8038954" y="2438058"/>
+            <a:ext cx="3820813" cy="3693319"/>
           </a:xfrm>
           <a:prstGeom prst="rect">
             <a:avLst/>
@@ -9774,176 +9786,168 @@
           </a:bodyPr>
           <a:lstStyle/>
           <a:p>
-            <a:endParaRPr lang="en-US" sz="1400" dirty="0">
+            <a:endParaRPr lang="en-US" dirty="0">
               <a:latin typeface="Futura Light"/>
               <a:cs typeface="Arial" panose="020B0604020202020204" pitchFamily="34" charset="0"/>
             </a:endParaRPr>
           </a:p>
           <a:p>
             <a:r>
-              <a:rPr lang="en-US" sz="1400" dirty="0">
+              <a:rPr lang="en-US" dirty="0">
                 <a:latin typeface="Futura Light"/>
                 <a:cs typeface="Arial" panose="020B0604020202020204" pitchFamily="34" charset="0"/>
               </a:rPr>
               <a:t>// location of an </a:t>
             </a:r>
             <a:r>
-              <a:rPr lang="en-US" sz="1400" dirty="0" err="1">
-                <a:latin typeface="Futura Light"/>
-                <a:cs typeface="Arial" panose="020B0604020202020204" pitchFamily="34" charset="0"/>
-              </a:rPr>
-              <a:t>EndUSers</a:t>
-            </a:r>
-            <a:r>
-              <a:rPr lang="en-US" sz="1400" dirty="0">
-                <a:latin typeface="Futura Light"/>
-                <a:cs typeface="Arial" panose="020B0604020202020204" pitchFamily="34" charset="0"/>
-              </a:rPr>
-              <a:t> should be equal to reverse </a:t>
-            </a:r>
-            <a:r>
-              <a:rPr lang="en-US" sz="1400" dirty="0" err="1">
-                <a:latin typeface="Futura Light"/>
-                <a:cs typeface="Arial" panose="020B0604020202020204" pitchFamily="34" charset="0"/>
-              </a:rPr>
-              <a:t>giocodding</a:t>
-            </a:r>
-            <a:r>
-              <a:rPr lang="en-US" sz="1400" dirty="0">
-                <a:latin typeface="Futura Light"/>
-                <a:cs typeface="Arial" panose="020B0604020202020204" pitchFamily="34" charset="0"/>
-              </a:rPr>
-              <a:t> address</a:t>
-            </a:r>
-          </a:p>
-          <a:p>
-            <a:endParaRPr lang="en-US" sz="1400" dirty="0">
+              <a:rPr lang="en-US" dirty="0" err="1">
+                <a:latin typeface="Futura Light"/>
+                <a:cs typeface="Arial" panose="020B0604020202020204" pitchFamily="34" charset="0"/>
+              </a:rPr>
+              <a:t>EndUser</a:t>
+            </a:r>
+            <a:r>
+              <a:rPr lang="en-US" dirty="0">
+                <a:latin typeface="Futura Light"/>
+                <a:cs typeface="Arial" panose="020B0604020202020204" pitchFamily="34" charset="0"/>
+              </a:rPr>
+              <a:t> should be equal to the reverse geocoding address</a:t>
+            </a:r>
+          </a:p>
+          <a:p>
+            <a:endParaRPr lang="en-US" dirty="0">
               <a:latin typeface="Futura Light"/>
               <a:cs typeface="Arial" panose="020B0604020202020204" pitchFamily="34" charset="0"/>
             </a:endParaRPr>
           </a:p>
           <a:p>
-            <a:r>
-              <a:rPr lang="en-US" sz="1400" dirty="0">
-                <a:latin typeface="Futura Light"/>
-                <a:cs typeface="Arial" panose="020B0604020202020204" pitchFamily="34" charset="0"/>
-              </a:rPr>
-              <a:t>fact </a:t>
-            </a:r>
-            <a:r>
-              <a:rPr lang="en-US" sz="1400" dirty="0" err="1">
-                <a:latin typeface="Futura Light"/>
-                <a:cs typeface="Arial" panose="020B0604020202020204" pitchFamily="34" charset="0"/>
-              </a:rPr>
-              <a:t>EqualLocationForEndUserAndGio</a:t>
-            </a:r>
-            <a:r>
-              <a:rPr lang="en-US" sz="1400" dirty="0">
-                <a:latin typeface="Futura Light"/>
-                <a:cs typeface="Arial" panose="020B0604020202020204" pitchFamily="34" charset="0"/>
-              </a:rPr>
-              <a:t> {</a:t>
-            </a:r>
-          </a:p>
-          <a:p>
-            <a:r>
-              <a:rPr lang="en-US" sz="1400" dirty="0">
-                <a:latin typeface="Futura Light"/>
-                <a:cs typeface="Arial" panose="020B0604020202020204" pitchFamily="34" charset="0"/>
-              </a:rPr>
-              <a:t>one </a:t>
-            </a:r>
-            <a:r>
-              <a:rPr lang="en-US" sz="1400" dirty="0" err="1">
-                <a:latin typeface="Futura Light"/>
-                <a:cs typeface="Arial" panose="020B0604020202020204" pitchFamily="34" charset="0"/>
-              </a:rPr>
-              <a:t>revGio</a:t>
-            </a:r>
-            <a:r>
-              <a:rPr lang="en-US" sz="1400" dirty="0">
-                <a:latin typeface="Futura Light"/>
-                <a:cs typeface="Arial" panose="020B0604020202020204" pitchFamily="34" charset="0"/>
-              </a:rPr>
-              <a:t> : </a:t>
-            </a:r>
-            <a:r>
-              <a:rPr lang="en-US" sz="1400" dirty="0" err="1">
-                <a:latin typeface="Futura Light"/>
-                <a:cs typeface="Arial" panose="020B0604020202020204" pitchFamily="34" charset="0"/>
-              </a:rPr>
-              <a:t>ReverseGioCoding</a:t>
-            </a:r>
-            <a:r>
-              <a:rPr lang="en-US" sz="1400" dirty="0">
-                <a:latin typeface="Futura Light"/>
-                <a:cs typeface="Arial" panose="020B0604020202020204" pitchFamily="34" charset="0"/>
-              </a:rPr>
-              <a:t>|</a:t>
-            </a:r>
-          </a:p>
-          <a:p>
-            <a:r>
-              <a:rPr lang="en-US" sz="1400" dirty="0">
-                <a:latin typeface="Futura Light"/>
-                <a:cs typeface="Arial" panose="020B0604020202020204" pitchFamily="34" charset="0"/>
-              </a:rPr>
-              <a:t>one u : </a:t>
-            </a:r>
-            <a:r>
-              <a:rPr lang="en-US" sz="1400" dirty="0" err="1">
-                <a:latin typeface="Futura Light"/>
-                <a:cs typeface="Arial" panose="020B0604020202020204" pitchFamily="34" charset="0"/>
-              </a:rPr>
-              <a:t>EndUser</a:t>
-            </a:r>
-            <a:r>
-              <a:rPr lang="en-US" sz="1400" dirty="0">
-                <a:latin typeface="Futura Light"/>
-                <a:cs typeface="Arial" panose="020B0604020202020204" pitchFamily="34" charset="0"/>
-              </a:rPr>
-              <a:t> |</a:t>
-            </a:r>
-          </a:p>
-          <a:p>
-            <a:r>
-              <a:rPr lang="en-US" sz="1400" dirty="0" err="1">
-                <a:latin typeface="Futura Light"/>
-                <a:cs typeface="Arial" panose="020B0604020202020204" pitchFamily="34" charset="0"/>
-              </a:rPr>
-              <a:t>revGio.loc</a:t>
-            </a:r>
-            <a:r>
-              <a:rPr lang="en-US" sz="1400" dirty="0">
-                <a:latin typeface="Futura Light"/>
-                <a:cs typeface="Arial" panose="020B0604020202020204" pitchFamily="34" charset="0"/>
-              </a:rPr>
-              <a:t> = </a:t>
-            </a:r>
-            <a:r>
-              <a:rPr lang="en-US" sz="1400" dirty="0" err="1">
-                <a:latin typeface="Futura Light"/>
-                <a:cs typeface="Arial" panose="020B0604020202020204" pitchFamily="34" charset="0"/>
-              </a:rPr>
-              <a:t>u.userLocation</a:t>
-            </a:r>
-            <a:endParaRPr lang="en-US" sz="1400" dirty="0">
+            <a:endParaRPr lang="en-US" dirty="0">
               <a:latin typeface="Futura Light"/>
               <a:cs typeface="Arial" panose="020B0604020202020204" pitchFamily="34" charset="0"/>
             </a:endParaRPr>
           </a:p>
           <a:p>
             <a:r>
-              <a:rPr lang="en-US" sz="1400" dirty="0">
+              <a:rPr lang="en-US" dirty="0">
+                <a:latin typeface="Futura Light"/>
+                <a:cs typeface="Arial" panose="020B0604020202020204" pitchFamily="34" charset="0"/>
+              </a:rPr>
+              <a:t>fact </a:t>
+            </a:r>
+            <a:r>
+              <a:rPr lang="en-US" b="1" dirty="0" err="1">
+                <a:latin typeface="Futura Light"/>
+                <a:cs typeface="Arial" panose="020B0604020202020204" pitchFamily="34" charset="0"/>
+              </a:rPr>
+              <a:t>EqualLocationForEndUserAndGeo</a:t>
+            </a:r>
+            <a:r>
+              <a:rPr lang="en-US" dirty="0">
+                <a:latin typeface="Futura Light"/>
+                <a:cs typeface="Arial" panose="020B0604020202020204" pitchFamily="34" charset="0"/>
+              </a:rPr>
+              <a:t> {</a:t>
+            </a:r>
+          </a:p>
+          <a:p>
+            <a:r>
+              <a:rPr lang="en-US" dirty="0">
+                <a:latin typeface="Futura Light"/>
+                <a:cs typeface="Arial" panose="020B0604020202020204" pitchFamily="34" charset="0"/>
+              </a:rPr>
+              <a:t>one </a:t>
+            </a:r>
+            <a:r>
+              <a:rPr lang="en-US" dirty="0" err="1">
+                <a:latin typeface="Futura Light"/>
+                <a:cs typeface="Arial" panose="020B0604020202020204" pitchFamily="34" charset="0"/>
+              </a:rPr>
+              <a:t>revGeo</a:t>
+            </a:r>
+            <a:r>
+              <a:rPr lang="en-US" dirty="0">
+                <a:latin typeface="Futura Light"/>
+                <a:cs typeface="Arial" panose="020B0604020202020204" pitchFamily="34" charset="0"/>
+              </a:rPr>
+              <a:t> : </a:t>
+            </a:r>
+            <a:r>
+              <a:rPr lang="en-US" dirty="0" err="1">
+                <a:latin typeface="Futura Light"/>
+                <a:cs typeface="Arial" panose="020B0604020202020204" pitchFamily="34" charset="0"/>
+              </a:rPr>
+              <a:t>ReverseGeoCoding</a:t>
+            </a:r>
+            <a:r>
+              <a:rPr lang="en-US" dirty="0">
+                <a:latin typeface="Futura Light"/>
+                <a:cs typeface="Arial" panose="020B0604020202020204" pitchFamily="34" charset="0"/>
+              </a:rPr>
+              <a:t>|</a:t>
+            </a:r>
+          </a:p>
+          <a:p>
+            <a:r>
+              <a:rPr lang="en-US" dirty="0">
+                <a:latin typeface="Futura Light"/>
+                <a:cs typeface="Arial" panose="020B0604020202020204" pitchFamily="34" charset="0"/>
+              </a:rPr>
+              <a:t>one u : </a:t>
+            </a:r>
+            <a:r>
+              <a:rPr lang="en-US" dirty="0" err="1">
+                <a:latin typeface="Futura Light"/>
+                <a:cs typeface="Arial" panose="020B0604020202020204" pitchFamily="34" charset="0"/>
+              </a:rPr>
+              <a:t>EndUser</a:t>
+            </a:r>
+            <a:r>
+              <a:rPr lang="en-US" dirty="0">
+                <a:latin typeface="Futura Light"/>
+                <a:cs typeface="Arial" panose="020B0604020202020204" pitchFamily="34" charset="0"/>
+              </a:rPr>
+              <a:t> |</a:t>
+            </a:r>
+          </a:p>
+          <a:p>
+            <a:r>
+              <a:rPr lang="en-US" dirty="0" err="1">
+                <a:latin typeface="Futura Light"/>
+                <a:cs typeface="Arial" panose="020B0604020202020204" pitchFamily="34" charset="0"/>
+              </a:rPr>
+              <a:t>revGeo.loc</a:t>
+            </a:r>
+            <a:r>
+              <a:rPr lang="en-US" dirty="0">
+                <a:latin typeface="Futura Light"/>
+                <a:cs typeface="Arial" panose="020B0604020202020204" pitchFamily="34" charset="0"/>
+              </a:rPr>
+              <a:t> = </a:t>
+            </a:r>
+            <a:r>
+              <a:rPr lang="en-US" dirty="0" err="1">
+                <a:latin typeface="Futura Light"/>
+                <a:cs typeface="Arial" panose="020B0604020202020204" pitchFamily="34" charset="0"/>
+              </a:rPr>
+              <a:t>u.userLocation</a:t>
+            </a:r>
+            <a:endParaRPr lang="en-US" dirty="0">
+              <a:latin typeface="Futura Light"/>
+              <a:cs typeface="Arial" panose="020B0604020202020204" pitchFamily="34" charset="0"/>
+            </a:endParaRPr>
+          </a:p>
+          <a:p>
+            <a:r>
+              <a:rPr lang="en-US" dirty="0">
                 <a:latin typeface="Futura Light"/>
                 <a:cs typeface="Arial" panose="020B0604020202020204" pitchFamily="34" charset="0"/>
               </a:rPr>
               <a:t>}</a:t>
             </a:r>
             <a:br>
-              <a:rPr lang="en-US" sz="1400" dirty="0"/>
+              <a:rPr lang="en-US" dirty="0"/>
             </a:br>
-            <a:endParaRPr lang="en-US" sz="1400" dirty="0">
+            <a:endParaRPr lang="en-US" dirty="0">
               <a:latin typeface="Arial" panose="020B0604020202020204" pitchFamily="34" charset="0"/>
               <a:cs typeface="Arial" panose="020B0604020202020204" pitchFamily="34" charset="0"/>
             </a:endParaRPr>
@@ -10079,8 +10083,8 @@
         </p:nvSpPr>
         <p:spPr>
           <a:xfrm>
-            <a:off x="3945452" y="2119358"/>
-            <a:ext cx="3096344" cy="2246769"/>
+            <a:off x="4348181" y="2545736"/>
+            <a:ext cx="3495637" cy="2862322"/>
           </a:xfrm>
           <a:prstGeom prst="rect">
             <a:avLst/>
@@ -10092,131 +10096,86 @@
           </a:bodyPr>
           <a:lstStyle/>
           <a:p>
-            <a:endParaRPr lang="en-US" sz="1400" dirty="0">
+            <a:endParaRPr lang="en-US" dirty="0">
               <a:latin typeface="Arial" panose="020B0604020202020204" pitchFamily="34" charset="0"/>
               <a:cs typeface="Arial" panose="020B0604020202020204" pitchFamily="34" charset="0"/>
             </a:endParaRPr>
           </a:p>
           <a:p>
             <a:r>
-              <a:rPr lang="en-US" sz="1400" dirty="0">
-                <a:latin typeface="Futura Light"/>
-                <a:cs typeface="Arial" panose="020B0604020202020204" pitchFamily="34" charset="0"/>
-              </a:rPr>
-              <a:t>// Each Ticket Issued by One Third Party</a:t>
-            </a:r>
+              <a:rPr lang="en-US" dirty="0">
+                <a:latin typeface="Futura Light"/>
+                <a:cs typeface="Arial" panose="020B0604020202020204" pitchFamily="34" charset="0"/>
+              </a:rPr>
+              <a:t>// Each Ticket Issued by one Authority</a:t>
+            </a:r>
+          </a:p>
+          <a:p>
+            <a:endParaRPr lang="en-US" dirty="0">
+              <a:latin typeface="Futura Light"/>
+              <a:cs typeface="Arial" panose="020B0604020202020204" pitchFamily="34" charset="0"/>
+            </a:endParaRPr>
           </a:p>
           <a:p>
             <a:br>
-              <a:rPr lang="en-US" sz="1400" dirty="0">
+              <a:rPr lang="en-US" dirty="0">
                 <a:latin typeface="Futura Light"/>
                 <a:cs typeface="Arial" panose="020B0604020202020204" pitchFamily="34" charset="0"/>
               </a:rPr>
             </a:br>
             <a:r>
-              <a:rPr lang="en-US" sz="1400" dirty="0">
-                <a:latin typeface="Futura Light"/>
-                <a:cs typeface="Arial" panose="020B0604020202020204" pitchFamily="34" charset="0"/>
-              </a:rPr>
-              <a:t>Fact {</a:t>
+              <a:rPr lang="en-US" dirty="0">
+                <a:latin typeface="Futura Light"/>
+                <a:cs typeface="Arial" panose="020B0604020202020204" pitchFamily="34" charset="0"/>
+              </a:rPr>
+              <a:t>fact </a:t>
+            </a:r>
+          </a:p>
+          <a:p>
+            <a:r>
+              <a:rPr lang="en-US" b="1" dirty="0" err="1">
+                <a:latin typeface="Futura Light"/>
+                <a:cs typeface="Arial" panose="020B0604020202020204" pitchFamily="34" charset="0"/>
+              </a:rPr>
+              <a:t>EachTicketOneAuthority</a:t>
+            </a:r>
+            <a:r>
+              <a:rPr lang="en-US" dirty="0">
+                <a:latin typeface="Futura Light"/>
+                <a:cs typeface="Arial" panose="020B0604020202020204" pitchFamily="34" charset="0"/>
+              </a:rPr>
+              <a:t> {</a:t>
             </a:r>
             <a:br>
-              <a:rPr lang="en-US" sz="1400" dirty="0">
+              <a:rPr lang="en-US" dirty="0">
                 <a:latin typeface="Futura Light"/>
                 <a:cs typeface="Arial" panose="020B0604020202020204" pitchFamily="34" charset="0"/>
               </a:rPr>
             </a:br>
             <a:r>
-              <a:rPr lang="en-US" sz="1400" dirty="0">
-                <a:latin typeface="Futura Light"/>
-                <a:cs typeface="Arial" panose="020B0604020202020204" pitchFamily="34" charset="0"/>
-              </a:rPr>
-              <a:t>   all t: Ticket |</a:t>
-            </a:r>
-            <a:br>
-              <a:rPr lang="en-US" sz="1400" dirty="0">
-                <a:latin typeface="Futura Light"/>
-                <a:cs typeface="Arial" panose="020B0604020202020204" pitchFamily="34" charset="0"/>
-              </a:rPr>
-            </a:br>
-            <a:r>
-              <a:rPr lang="en-US" sz="1400" dirty="0">
-                <a:latin typeface="Futura Light"/>
-                <a:cs typeface="Arial" panose="020B0604020202020204" pitchFamily="34" charset="0"/>
-              </a:rPr>
-              <a:t>   one </a:t>
-            </a:r>
-            <a:r>
-              <a:rPr lang="en-US" sz="1400" dirty="0" err="1">
-                <a:latin typeface="Futura Light"/>
-                <a:cs typeface="Arial" panose="020B0604020202020204" pitchFamily="34" charset="0"/>
-              </a:rPr>
-              <a:t>tp</a:t>
-            </a:r>
-            <a:r>
-              <a:rPr lang="en-US" sz="1400" dirty="0">
-                <a:latin typeface="Futura Light"/>
-                <a:cs typeface="Arial" panose="020B0604020202020204" pitchFamily="34" charset="0"/>
-              </a:rPr>
-              <a:t>: </a:t>
-            </a:r>
-            <a:r>
-              <a:rPr lang="en-US" sz="1400" dirty="0" err="1">
-                <a:latin typeface="Futura Light"/>
-                <a:cs typeface="Arial" panose="020B0604020202020204" pitchFamily="34" charset="0"/>
-              </a:rPr>
-              <a:t>ThirdParty</a:t>
-            </a:r>
-            <a:r>
-              <a:rPr lang="en-US" sz="1400" dirty="0">
-                <a:latin typeface="Futura Light"/>
-                <a:cs typeface="Arial" panose="020B0604020202020204" pitchFamily="34" charset="0"/>
-              </a:rPr>
-              <a:t> |</a:t>
-            </a:r>
-            <a:br>
-              <a:rPr lang="en-US" sz="1400" dirty="0">
-                <a:latin typeface="Futura Light"/>
-                <a:cs typeface="Arial" panose="020B0604020202020204" pitchFamily="34" charset="0"/>
-              </a:rPr>
-            </a:br>
-            <a:r>
-              <a:rPr lang="en-US" sz="1400" dirty="0">
-                <a:latin typeface="Futura Light"/>
-                <a:cs typeface="Arial" panose="020B0604020202020204" pitchFamily="34" charset="0"/>
-              </a:rPr>
-              <a:t>   </a:t>
-            </a:r>
-            <a:r>
-              <a:rPr lang="en-US" sz="1400" dirty="0" err="1">
-                <a:latin typeface="Futura Light"/>
-                <a:cs typeface="Arial" panose="020B0604020202020204" pitchFamily="34" charset="0"/>
-              </a:rPr>
-              <a:t>tp.tickets</a:t>
-            </a:r>
-            <a:r>
-              <a:rPr lang="en-US" sz="1400" dirty="0">
+              <a:rPr lang="en-US" dirty="0">
+                <a:latin typeface="Futura Light"/>
+                <a:cs typeface="Arial" panose="020B0604020202020204" pitchFamily="34" charset="0"/>
+              </a:rPr>
+              <a:t>all t: Ticket | one au: Authority | </a:t>
+            </a:r>
+            <a:r>
+              <a:rPr lang="en-US" dirty="0" err="1">
+                <a:latin typeface="Futura Light"/>
+                <a:cs typeface="Arial" panose="020B0604020202020204" pitchFamily="34" charset="0"/>
+              </a:rPr>
+              <a:t>au.tickets</a:t>
+            </a:r>
+            <a:r>
+              <a:rPr lang="en-US" dirty="0">
                 <a:latin typeface="Futura Light"/>
                 <a:cs typeface="Arial" panose="020B0604020202020204" pitchFamily="34" charset="0"/>
               </a:rPr>
               <a:t> = t </a:t>
             </a:r>
-            <a:br>
-              <a:rPr lang="en-US" sz="1400" dirty="0">
-                <a:latin typeface="Futura Light"/>
-                <a:cs typeface="Arial" panose="020B0604020202020204" pitchFamily="34" charset="0"/>
-              </a:rPr>
-            </a:br>
-            <a:r>
-              <a:rPr lang="en-US" sz="1400" dirty="0">
-                <a:latin typeface="Futura Light"/>
-                <a:cs typeface="Arial" panose="020B0604020202020204" pitchFamily="34" charset="0"/>
-              </a:rPr>
-              <a:t>}</a:t>
-            </a:r>
-          </a:p>
-          <a:p>
-            <a:endParaRPr lang="en-US" sz="1400" dirty="0">
+          </a:p>
+          <a:p>
+            <a:endParaRPr lang="en-US" dirty="0">
               <a:latin typeface="Arial" panose="020B0604020202020204" pitchFamily="34" charset="0"/>
               <a:cs typeface="Arial" panose="020B0604020202020204" pitchFamily="34" charset="0"/>
             </a:endParaRPr>

</xml_diff>